<commit_message>
reset password, mas estilos
</commit_message>
<xml_diff>
--- a/visitas_stg/static/ppt/ppt-generados/FichaTecnicaObras_1.pptx
+++ b/visitas_stg/static/ppt/ppt-generados/FichaTecnicaObras_1.pptx
@@ -4924,7 +4924,7 @@
               <a:defRPr sz="800"/>
             </a:pPr>
             <a:r>
-              <a:t>SEGOB_001</a:t>
+              <a:t>SEGOB_002</a:t>
             </a:r>
             <a:endParaRPr lang="es-MX" sz="800" b="1" dirty="0">
               <a:latin typeface="Verdana" panose="020B0604030504040204" pitchFamily="34" charset="0"/>
@@ -4996,7 +4996,7 @@
               <a:defRPr sz="800"/>
             </a:pPr>
             <a:r>
-              <a:t>2015-10-28</a:t>
+              <a:t>2015-10-15</a:t>
             </a:r>
             <a:endParaRPr lang="es-MX" sz="800" b="1" dirty="0">
               <a:latin typeface="Verdana" panose="020B0604030504040204" pitchFamily="34" charset="0"/>
@@ -5068,7 +5068,7 @@
               <a:defRPr sz="800"/>
             </a:pPr>
             <a:r>
-              <a:t>CAMPECHE</a:t>
+              <a:t>AGUASCALIENTES</a:t>
             </a:r>
             <a:endParaRPr lang="es-MX" sz="800" b="1" dirty="0">
               <a:latin typeface="Verdana" panose="020B0604030504040204" pitchFamily="34" charset="0"/>
@@ -5104,7 +5104,7 @@
               <a:defRPr sz="800"/>
             </a:pPr>
             <a:r>
-              <a:t>Ramos Arizpe</a:t>
+              <a:t>Asientos</a:t>
             </a:r>
             <a:endParaRPr lang="es-MX" sz="800" b="1" dirty="0">
               <a:latin typeface="Verdana" panose="020B0604030504040204" pitchFamily="34" charset="0"/>
@@ -5140,7 +5140,7 @@
               <a:defRPr sz="800"/>
             </a:pPr>
             <a:r>
-              <a:t>II Distrito Electoral Federal de Aguascalientes</a:t>
+              <a:t>I Distrito Electoral Federal de Aguascalientes</a:t>
             </a:r>
             <a:endParaRPr lang="es-MX" sz="800" b="1" dirty="0">
               <a:latin typeface="Verdana" panose="020B0604030504040204" pitchFamily="34" charset="0"/>
@@ -5176,7 +5176,7 @@
               <a:defRPr sz="800"/>
             </a:pPr>
             <a:r>
-              <a:t>PEDRO</a:t>
+              <a:t>ALEX</a:t>
             </a:r>
             <a:endParaRPr lang="es-MX" sz="800" b="1" dirty="0">
               <a:latin typeface="Verdana" panose="020B0604030504040204" pitchFamily="34" charset="0"/>
@@ -5212,7 +5212,7 @@
               <a:defRPr sz="800"/>
             </a:pPr>
             <a:r>
-              <a:t>PAN</a:t>
+              <a:t>PRI</a:t>
             </a:r>
             <a:endParaRPr lang="es-MX" sz="800" b="1" dirty="0">
               <a:latin typeface="Verdana" panose="020B0604030504040204" pitchFamily="34" charset="0"/>
@@ -5248,7 +5248,7 @@
               <a:defRPr sz="800"/>
             </a:pPr>
             <a:r>
-              <a:t>TESORERO</a:t>
+              <a:t>PRESINDENTE</a:t>
             </a:r>
             <a:endParaRPr lang="es-MX" sz="800" b="1" dirty="0">
               <a:latin typeface="Verdana" panose="020B0604030504040204" pitchFamily="34" charset="0"/>
@@ -5737,7 +5737,7 @@
               <a:defRPr sz="800"/>
             </a:pPr>
             <a:r>
-              <a:t>Alvaro ruiz</a:t>
+              <a:t>Arturo Gasca</a:t>
             </a:r>
             <a:endParaRPr lang="es-MX" sz="900" b="1" dirty="0">
               <a:latin typeface="Verdana" panose="020B0604030504040204" pitchFamily="34" charset="0"/>
@@ -5773,7 +5773,7 @@
               <a:defRPr sz="800"/>
             </a:pPr>
             <a:r>
-              <a:t>presidente</a:t>
+              <a:t>Secretario Municipal</a:t>
             </a:r>
             <a:endParaRPr lang="es-MX" sz="900" b="1" dirty="0">
               <a:latin typeface="Verdana" panose="020B0604030504040204" pitchFamily="34" charset="0"/>
@@ -5809,7 +5809,7 @@
               <a:defRPr sz="800"/>
             </a:pPr>
             <a:r>
-              <a:t>ayuda al comercio local</a:t>
+              <a:t>la falta de motivación de la población ha bajado la preferencia al partido</a:t>
             </a:r>
             <a:endParaRPr lang="es-MX" sz="800" dirty="0">
               <a:latin typeface="Verdana" panose="020B0604030504040204" pitchFamily="34" charset="0"/>
@@ -5845,7 +5845,7 @@
               <a:defRPr sz="800"/>
             </a:pPr>
             <a:r>
-              <a:t>Radio</a:t>
+              <a:t>Periódico</a:t>
             </a:r>
             <a:endParaRPr lang="es-MX" sz="900" b="1" dirty="0">
               <a:latin typeface="Verdana" panose="020B0604030504040204" pitchFamily="34" charset="0"/>
@@ -5881,7 +5881,7 @@
               <a:defRPr sz="800"/>
             </a:pPr>
             <a:r>
-              <a:t>Spot</a:t>
+              <a:t>Columna Política</a:t>
             </a:r>
             <a:endParaRPr lang="es-MX" sz="900" b="1" dirty="0">
               <a:latin typeface="Verdana" panose="020B0604030504040204" pitchFamily="34" charset="0"/>
@@ -5917,7 +5917,7 @@
               <a:defRPr sz="800"/>
             </a:pPr>
             <a:r>
-              <a:t>la K buena</a:t>
+              <a:t>local</a:t>
             </a:r>
             <a:endParaRPr lang="es-MX" sz="900" b="1" dirty="0">
               <a:latin typeface="Verdana" panose="020B0604030504040204" pitchFamily="34" charset="0"/>
@@ -5953,7 +5953,7 @@
               <a:defRPr sz="800"/>
             </a:pPr>
             <a:r>
-              <a:t>43</a:t>
+              <a:t>3</a:t>
             </a:r>
             <a:endParaRPr lang="es-MX" sz="900" b="1" dirty="0">
               <a:latin typeface="Verdana" panose="020B0604030504040204" pitchFamily="34" charset="0"/>

</xml_diff>